<commit_message>
Finished all gating/graph corrections.
</commit_message>
<xml_diff>
--- a/Figures/Powerpoints/MatBincreasesthyProB gating ppt.pptx
+++ b/Figures/Powerpoints/MatBincreasesthyProB gating ppt.pptx
@@ -208,7 +208,7 @@
           <a:p>
             <a:fld id="{A1170C28-2994-474D-8BBF-3B11C9FA2A9F}" type="datetimeFigureOut">
               <a:rPr lang="en-GB" smtClean="0"/>
-              <a:t>17/02/2016</a:t>
+              <a:t>18/02/2016</a:t>
             </a:fld>
             <a:endParaRPr lang="en-GB"/>
           </a:p>
@@ -607,7 +607,7 @@
           <a:p>
             <a:fld id="{71B8501F-095D-4FB7-9E41-AD32C3E49B00}" type="datetimeFigureOut">
               <a:rPr lang="en-GB" smtClean="0"/>
-              <a:t>17/02/2016</a:t>
+              <a:t>18/02/2016</a:t>
             </a:fld>
             <a:endParaRPr lang="en-GB"/>
           </a:p>
@@ -777,7 +777,7 @@
           <a:p>
             <a:fld id="{71B8501F-095D-4FB7-9E41-AD32C3E49B00}" type="datetimeFigureOut">
               <a:rPr lang="en-GB" smtClean="0"/>
-              <a:t>17/02/2016</a:t>
+              <a:t>18/02/2016</a:t>
             </a:fld>
             <a:endParaRPr lang="en-GB"/>
           </a:p>
@@ -957,7 +957,7 @@
           <a:p>
             <a:fld id="{71B8501F-095D-4FB7-9E41-AD32C3E49B00}" type="datetimeFigureOut">
               <a:rPr lang="en-GB" smtClean="0"/>
-              <a:t>17/02/2016</a:t>
+              <a:t>18/02/2016</a:t>
             </a:fld>
             <a:endParaRPr lang="en-GB"/>
           </a:p>
@@ -1127,7 +1127,7 @@
           <a:p>
             <a:fld id="{71B8501F-095D-4FB7-9E41-AD32C3E49B00}" type="datetimeFigureOut">
               <a:rPr lang="en-GB" smtClean="0"/>
-              <a:t>17/02/2016</a:t>
+              <a:t>18/02/2016</a:t>
             </a:fld>
             <a:endParaRPr lang="en-GB"/>
           </a:p>
@@ -1373,7 +1373,7 @@
           <a:p>
             <a:fld id="{71B8501F-095D-4FB7-9E41-AD32C3E49B00}" type="datetimeFigureOut">
               <a:rPr lang="en-GB" smtClean="0"/>
-              <a:t>17/02/2016</a:t>
+              <a:t>18/02/2016</a:t>
             </a:fld>
             <a:endParaRPr lang="en-GB"/>
           </a:p>
@@ -1605,7 +1605,7 @@
           <a:p>
             <a:fld id="{71B8501F-095D-4FB7-9E41-AD32C3E49B00}" type="datetimeFigureOut">
               <a:rPr lang="en-GB" smtClean="0"/>
-              <a:t>17/02/2016</a:t>
+              <a:t>18/02/2016</a:t>
             </a:fld>
             <a:endParaRPr lang="en-GB"/>
           </a:p>
@@ -1972,7 +1972,7 @@
           <a:p>
             <a:fld id="{71B8501F-095D-4FB7-9E41-AD32C3E49B00}" type="datetimeFigureOut">
               <a:rPr lang="en-GB" smtClean="0"/>
-              <a:t>17/02/2016</a:t>
+              <a:t>18/02/2016</a:t>
             </a:fld>
             <a:endParaRPr lang="en-GB"/>
           </a:p>
@@ -2090,7 +2090,7 @@
           <a:p>
             <a:fld id="{71B8501F-095D-4FB7-9E41-AD32C3E49B00}" type="datetimeFigureOut">
               <a:rPr lang="en-GB" smtClean="0"/>
-              <a:t>17/02/2016</a:t>
+              <a:t>18/02/2016</a:t>
             </a:fld>
             <a:endParaRPr lang="en-GB"/>
           </a:p>
@@ -2185,7 +2185,7 @@
           <a:p>
             <a:fld id="{71B8501F-095D-4FB7-9E41-AD32C3E49B00}" type="datetimeFigureOut">
               <a:rPr lang="en-GB" smtClean="0"/>
-              <a:t>17/02/2016</a:t>
+              <a:t>18/02/2016</a:t>
             </a:fld>
             <a:endParaRPr lang="en-GB"/>
           </a:p>
@@ -2462,7 +2462,7 @@
           <a:p>
             <a:fld id="{71B8501F-095D-4FB7-9E41-AD32C3E49B00}" type="datetimeFigureOut">
               <a:rPr lang="en-GB" smtClean="0"/>
-              <a:t>17/02/2016</a:t>
+              <a:t>18/02/2016</a:t>
             </a:fld>
             <a:endParaRPr lang="en-GB"/>
           </a:p>
@@ -2719,7 +2719,7 @@
           <a:p>
             <a:fld id="{71B8501F-095D-4FB7-9E41-AD32C3E49B00}" type="datetimeFigureOut">
               <a:rPr lang="en-GB" smtClean="0"/>
-              <a:t>17/02/2016</a:t>
+              <a:t>18/02/2016</a:t>
             </a:fld>
             <a:endParaRPr lang="en-GB"/>
           </a:p>
@@ -2932,7 +2932,7 @@
           <a:p>
             <a:fld id="{71B8501F-095D-4FB7-9E41-AD32C3E49B00}" type="datetimeFigureOut">
               <a:rPr lang="en-GB" smtClean="0"/>
-              <a:t>17/02/2016</a:t>
+              <a:t>18/02/2016</a:t>
             </a:fld>
             <a:endParaRPr lang="en-GB"/>
           </a:p>
@@ -3515,15 +3515,7 @@
           <a:p>
             <a:r>
               <a:rPr lang="en-GB" sz="2400" dirty="0" smtClean="0"/>
-              <a:t>Forward</a:t>
-            </a:r>
-            <a:r>
-              <a:rPr lang="en-GB" sz="2400" dirty="0" smtClean="0"/>
-              <a:t> </a:t>
-            </a:r>
-            <a:r>
-              <a:rPr lang="en-GB" sz="2400" dirty="0" smtClean="0"/>
-              <a:t>Scatter</a:t>
+              <a:t>Forward Scatter</a:t>
             </a:r>
             <a:endParaRPr lang="en-GB" sz="2400" dirty="0"/>
           </a:p>
@@ -3683,11 +3675,7 @@
           <a:p>
             <a:r>
               <a:rPr lang="en-GB" sz="2400" dirty="0" smtClean="0"/>
-              <a:t>CD4</a:t>
-            </a:r>
-            <a:r>
-              <a:rPr lang="en-GB" sz="2400" dirty="0" smtClean="0"/>
-              <a:t>3</a:t>
+              <a:t>CD43</a:t>
             </a:r>
             <a:endParaRPr lang="en-GB" sz="2400" dirty="0"/>
           </a:p>
@@ -3751,11 +3739,7 @@
           <a:p>
             <a:r>
               <a:rPr lang="en-GB" sz="2400" dirty="0" smtClean="0"/>
-              <a:t>C</a:t>
-            </a:r>
-            <a:r>
-              <a:rPr lang="en-GB" sz="2400" dirty="0" smtClean="0"/>
-              <a:t>D19</a:t>
+              <a:t>CD19</a:t>
             </a:r>
             <a:endParaRPr lang="en-GB" sz="2400" dirty="0"/>
           </a:p>
@@ -3937,6 +3921,156 @@
           </a:fontRef>
         </p:style>
       </p:cxnSp>
+      <p:sp>
+        <p:nvSpPr>
+          <p:cNvPr id="7" name="TextBox 6"/>
+          <p:cNvSpPr txBox="1"/>
+          <p:nvPr/>
+        </p:nvSpPr>
+        <p:spPr>
+          <a:xfrm>
+            <a:off x="1182875" y="992550"/>
+            <a:ext cx="1682127" cy="430887"/>
+          </a:xfrm>
+          <a:prstGeom prst="rect">
+            <a:avLst/>
+          </a:prstGeom>
+          <a:noFill/>
+        </p:spPr>
+        <p:txBody>
+          <a:bodyPr wrap="none" rtlCol="0">
+            <a:spAutoFit/>
+          </a:bodyPr>
+          <a:lstStyle/>
+          <a:p>
+            <a:r>
+              <a:rPr lang="en-GB" sz="2200" dirty="0" smtClean="0"/>
+              <a:t>Lymphocytes</a:t>
+            </a:r>
+            <a:endParaRPr lang="en-GB" sz="2200" dirty="0"/>
+          </a:p>
+        </p:txBody>
+      </p:sp>
+      <p:sp>
+        <p:nvSpPr>
+          <p:cNvPr id="22" name="TextBox 21"/>
+          <p:cNvSpPr txBox="1"/>
+          <p:nvPr/>
+        </p:nvSpPr>
+        <p:spPr>
+          <a:xfrm>
+            <a:off x="4567056" y="1066286"/>
+            <a:ext cx="1459054" cy="430887"/>
+          </a:xfrm>
+          <a:prstGeom prst="rect">
+            <a:avLst/>
+          </a:prstGeom>
+          <a:noFill/>
+        </p:spPr>
+        <p:txBody>
+          <a:bodyPr wrap="none" rtlCol="0">
+            <a:spAutoFit/>
+          </a:bodyPr>
+          <a:lstStyle/>
+          <a:p>
+            <a:r>
+              <a:rPr lang="en-GB" sz="2200" dirty="0" smtClean="0"/>
+              <a:t>Single Cells</a:t>
+            </a:r>
+            <a:endParaRPr lang="en-GB" sz="2200" dirty="0"/>
+          </a:p>
+        </p:txBody>
+      </p:sp>
+      <p:sp>
+        <p:nvSpPr>
+          <p:cNvPr id="25" name="TextBox 24"/>
+          <p:cNvSpPr txBox="1"/>
+          <p:nvPr/>
+        </p:nvSpPr>
+        <p:spPr>
+          <a:xfrm>
+            <a:off x="8868189" y="2645067"/>
+            <a:ext cx="715260" cy="430887"/>
+          </a:xfrm>
+          <a:prstGeom prst="rect">
+            <a:avLst/>
+          </a:prstGeom>
+          <a:noFill/>
+        </p:spPr>
+        <p:txBody>
+          <a:bodyPr wrap="none" rtlCol="0">
+            <a:spAutoFit/>
+          </a:bodyPr>
+          <a:lstStyle/>
+          <a:p>
+            <a:r>
+              <a:rPr lang="en-GB" sz="2200" dirty="0" smtClean="0"/>
+              <a:t>IgM-</a:t>
+            </a:r>
+            <a:endParaRPr lang="en-GB" sz="2200" dirty="0"/>
+          </a:p>
+        </p:txBody>
+      </p:sp>
+      <p:sp>
+        <p:nvSpPr>
+          <p:cNvPr id="30" name="TextBox 29"/>
+          <p:cNvSpPr txBox="1"/>
+          <p:nvPr/>
+        </p:nvSpPr>
+        <p:spPr>
+          <a:xfrm>
+            <a:off x="12344175" y="708926"/>
+            <a:ext cx="934871" cy="430887"/>
+          </a:xfrm>
+          <a:prstGeom prst="rect">
+            <a:avLst/>
+          </a:prstGeom>
+          <a:noFill/>
+        </p:spPr>
+        <p:txBody>
+          <a:bodyPr wrap="none" rtlCol="0">
+            <a:spAutoFit/>
+          </a:bodyPr>
+          <a:lstStyle/>
+          <a:p>
+            <a:r>
+              <a:rPr lang="en-GB" sz="2200" dirty="0" smtClean="0"/>
+              <a:t>CD43+</a:t>
+            </a:r>
+            <a:endParaRPr lang="en-GB" sz="2200" dirty="0"/>
+          </a:p>
+        </p:txBody>
+      </p:sp>
+      <p:sp>
+        <p:nvSpPr>
+          <p:cNvPr id="31" name="TextBox 30"/>
+          <p:cNvSpPr txBox="1"/>
+          <p:nvPr/>
+        </p:nvSpPr>
+        <p:spPr>
+          <a:xfrm>
+            <a:off x="15633586" y="701545"/>
+            <a:ext cx="1605183" cy="430887"/>
+          </a:xfrm>
+          <a:prstGeom prst="rect">
+            <a:avLst/>
+          </a:prstGeom>
+          <a:noFill/>
+        </p:spPr>
+        <p:txBody>
+          <a:bodyPr wrap="none" rtlCol="0">
+            <a:spAutoFit/>
+          </a:bodyPr>
+          <a:lstStyle/>
+          <a:p>
+            <a:r>
+              <a:rPr lang="en-GB" sz="2200" dirty="0" smtClean="0"/>
+              <a:t>CD19+ Pro B</a:t>
+            </a:r>
+            <a:endParaRPr lang="en-GB" sz="2200" dirty="0"/>
+          </a:p>
+        </p:txBody>
+      </p:sp>
     </p:spTree>
     <p:extLst>
       <p:ext uri="{BB962C8B-B14F-4D97-AF65-F5344CB8AC3E}">

</xml_diff>